<commit_message>
need to correct some mistakes
</commit_message>
<xml_diff>
--- a/source/supervised/gradient/figures/figures.pptx
+++ b/source/supervised/gradient/figures/figures.pptx
@@ -10,6 +10,7 @@
     <p:sldId id="258" r:id="rId4"/>
     <p:sldId id="259" r:id="rId5"/>
     <p:sldId id="260" r:id="rId6"/>
+    <p:sldId id="261" r:id="rId7"/>
   </p:sldIdLst>
   <p:sldSz cx="12192000" cy="6858000"/>
   <p:notesSz cx="6858000" cy="9144000"/>
@@ -382,8 +383,8 @@
           <c:showPercent val="0"/>
           <c:showBubbleSize val="0"/>
         </c:dLbls>
-        <c:axId val="103138224"/>
-        <c:axId val="103138784"/>
+        <c:axId val="215971616"/>
+        <c:axId val="215972176"/>
         <c:extLst>
           <c:ext xmlns:c15="http://schemas.microsoft.com/office/drawing/2012/chart" uri="{02D57815-91ED-43cb-92C2-25804820EDAC}">
             <c15:filteredScatterSeries>
@@ -642,7 +643,7 @@
         </c:extLst>
       </c:scatterChart>
       <c:valAx>
-        <c:axId val="103138224"/>
+        <c:axId val="215971616"/>
         <c:scaling>
           <c:orientation val="minMax"/>
           <c:max val="10"/>
@@ -698,12 +699,12 @@
             <a:endParaRPr lang="en-US"/>
           </a:p>
         </c:txPr>
-        <c:crossAx val="103138784"/>
+        <c:crossAx val="215972176"/>
         <c:crosses val="autoZero"/>
         <c:crossBetween val="midCat"/>
       </c:valAx>
       <c:valAx>
-        <c:axId val="103138784"/>
+        <c:axId val="215972176"/>
         <c:scaling>
           <c:orientation val="minMax"/>
         </c:scaling>
@@ -757,7 +758,7 @@
             <a:endParaRPr lang="en-US"/>
           </a:p>
         </c:txPr>
-        <c:crossAx val="103138224"/>
+        <c:crossAx val="215971616"/>
         <c:crosses val="autoZero"/>
         <c:crossBetween val="midCat"/>
         <c:majorUnit val="100"/>
@@ -1487,7 +1488,7 @@
           <a:p>
             <a:fld id="{0D348644-1F80-4F7B-9DEF-3ADA9E1B2418}" type="datetimeFigureOut">
               <a:rPr lang="en-US" smtClean="0"/>
-              <a:t>7/14/2019</a:t>
+              <a:t>7/26/2019</a:t>
             </a:fld>
             <a:endParaRPr lang="en-US"/>
           </a:p>
@@ -1657,7 +1658,7 @@
           <a:p>
             <a:fld id="{0D348644-1F80-4F7B-9DEF-3ADA9E1B2418}" type="datetimeFigureOut">
               <a:rPr lang="en-US" smtClean="0"/>
-              <a:t>7/14/2019</a:t>
+              <a:t>7/26/2019</a:t>
             </a:fld>
             <a:endParaRPr lang="en-US"/>
           </a:p>
@@ -1837,7 +1838,7 @@
           <a:p>
             <a:fld id="{0D348644-1F80-4F7B-9DEF-3ADA9E1B2418}" type="datetimeFigureOut">
               <a:rPr lang="en-US" smtClean="0"/>
-              <a:t>7/14/2019</a:t>
+              <a:t>7/26/2019</a:t>
             </a:fld>
             <a:endParaRPr lang="en-US"/>
           </a:p>
@@ -2007,7 +2008,7 @@
           <a:p>
             <a:fld id="{0D348644-1F80-4F7B-9DEF-3ADA9E1B2418}" type="datetimeFigureOut">
               <a:rPr lang="en-US" smtClean="0"/>
-              <a:t>7/14/2019</a:t>
+              <a:t>7/26/2019</a:t>
             </a:fld>
             <a:endParaRPr lang="en-US"/>
           </a:p>
@@ -2253,7 +2254,7 @@
           <a:p>
             <a:fld id="{0D348644-1F80-4F7B-9DEF-3ADA9E1B2418}" type="datetimeFigureOut">
               <a:rPr lang="en-US" smtClean="0"/>
-              <a:t>7/14/2019</a:t>
+              <a:t>7/26/2019</a:t>
             </a:fld>
             <a:endParaRPr lang="en-US"/>
           </a:p>
@@ -2485,7 +2486,7 @@
           <a:p>
             <a:fld id="{0D348644-1F80-4F7B-9DEF-3ADA9E1B2418}" type="datetimeFigureOut">
               <a:rPr lang="en-US" smtClean="0"/>
-              <a:t>7/14/2019</a:t>
+              <a:t>7/26/2019</a:t>
             </a:fld>
             <a:endParaRPr lang="en-US"/>
           </a:p>
@@ -2852,7 +2853,7 @@
           <a:p>
             <a:fld id="{0D348644-1F80-4F7B-9DEF-3ADA9E1B2418}" type="datetimeFigureOut">
               <a:rPr lang="en-US" smtClean="0"/>
-              <a:t>7/14/2019</a:t>
+              <a:t>7/26/2019</a:t>
             </a:fld>
             <a:endParaRPr lang="en-US"/>
           </a:p>
@@ -2970,7 +2971,7 @@
           <a:p>
             <a:fld id="{0D348644-1F80-4F7B-9DEF-3ADA9E1B2418}" type="datetimeFigureOut">
               <a:rPr lang="en-US" smtClean="0"/>
-              <a:t>7/14/2019</a:t>
+              <a:t>7/26/2019</a:t>
             </a:fld>
             <a:endParaRPr lang="en-US"/>
           </a:p>
@@ -3065,7 +3066,7 @@
           <a:p>
             <a:fld id="{0D348644-1F80-4F7B-9DEF-3ADA9E1B2418}" type="datetimeFigureOut">
               <a:rPr lang="en-US" smtClean="0"/>
-              <a:t>7/14/2019</a:t>
+              <a:t>7/26/2019</a:t>
             </a:fld>
             <a:endParaRPr lang="en-US"/>
           </a:p>
@@ -3342,7 +3343,7 @@
           <a:p>
             <a:fld id="{0D348644-1F80-4F7B-9DEF-3ADA9E1B2418}" type="datetimeFigureOut">
               <a:rPr lang="en-US" smtClean="0"/>
-              <a:t>7/14/2019</a:t>
+              <a:t>7/26/2019</a:t>
             </a:fld>
             <a:endParaRPr lang="en-US"/>
           </a:p>
@@ -3595,7 +3596,7 @@
           <a:p>
             <a:fld id="{0D348644-1F80-4F7B-9DEF-3ADA9E1B2418}" type="datetimeFigureOut">
               <a:rPr lang="en-US" smtClean="0"/>
-              <a:t>7/14/2019</a:t>
+              <a:t>7/26/2019</a:t>
             </a:fld>
             <a:endParaRPr lang="en-US"/>
           </a:p>
@@ -3808,7 +3809,7 @@
           <a:p>
             <a:fld id="{0D348644-1F80-4F7B-9DEF-3ADA9E1B2418}" type="datetimeFigureOut">
               <a:rPr lang="en-US" smtClean="0"/>
-              <a:t>7/14/2019</a:t>
+              <a:t>7/26/2019</a:t>
             </a:fld>
             <a:endParaRPr lang="en-US"/>
           </a:p>
@@ -6228,8 +6229,8 @@
           </a:fontRef>
         </p:style>
       </p:cxnSp>
-      <mc:AlternateContent xmlns:mc="http://schemas.openxmlformats.org/markup-compatibility/2006">
-        <mc:Choice xmlns:a14="http://schemas.microsoft.com/office/drawing/2010/main" Requires="a14">
+      <mc:AlternateContent xmlns:mc="http://schemas.openxmlformats.org/markup-compatibility/2006" xmlns:a14="http://schemas.microsoft.com/office/drawing/2010/main">
+        <mc:Choice Requires="a14">
           <p:sp>
             <p:nvSpPr>
               <p:cNvPr id="24" name="TextBox 23"/>
@@ -6252,6 +6253,7 @@
               </a:bodyPr>
               <a:lstStyle/>
               <a:p>
+                <a:pPr/>
                 <a14:m>
                   <m:oMathPara xmlns:m="http://schemas.openxmlformats.org/officeDocument/2006/math">
                     <m:oMathParaPr>
@@ -6357,7 +6359,7 @@
             </p:txBody>
           </p:sp>
         </mc:Choice>
-        <mc:Fallback>
+        <mc:Fallback xmlns="">
           <p:sp>
             <p:nvSpPr>
               <p:cNvPr id="24" name="TextBox 23"/>
@@ -7220,8 +7222,8 @@
           </a:p>
         </p:txBody>
       </p:sp>
-      <mc:AlternateContent xmlns:mc="http://schemas.openxmlformats.org/markup-compatibility/2006">
-        <mc:Choice xmlns:a14="http://schemas.microsoft.com/office/drawing/2010/main" Requires="a14">
+      <mc:AlternateContent xmlns:mc="http://schemas.openxmlformats.org/markup-compatibility/2006" xmlns:a14="http://schemas.microsoft.com/office/drawing/2010/main">
+        <mc:Choice Requires="a14">
           <p:sp>
             <p:nvSpPr>
               <p:cNvPr id="24" name="TextBox 23"/>
@@ -7244,6 +7246,7 @@
               </a:bodyPr>
               <a:lstStyle/>
               <a:p>
+                <a:pPr/>
                 <a14:m>
                   <m:oMathPara xmlns:m="http://schemas.openxmlformats.org/officeDocument/2006/math">
                     <m:oMathParaPr>
@@ -7356,7 +7359,7 @@
             </p:txBody>
           </p:sp>
         </mc:Choice>
-        <mc:Fallback>
+        <mc:Fallback xmlns="">
           <p:sp>
             <p:nvSpPr>
               <p:cNvPr id="24" name="TextBox 23"/>
@@ -7949,6 +7952,1998 @@
     <p:extLst>
       <p:ext uri="{BB962C8B-B14F-4D97-AF65-F5344CB8AC3E}">
         <p14:creationId xmlns:p14="http://schemas.microsoft.com/office/powerpoint/2010/main" val="1553972098"/>
+      </p:ext>
+    </p:extLst>
+  </p:cSld>
+  <p:clrMapOvr>
+    <a:masterClrMapping/>
+  </p:clrMapOvr>
+</p:sld>
+</file>
+
+<file path=ppt/slides/slide6.xml><?xml version="1.0" encoding="utf-8"?>
+<p:sld xmlns:a="http://schemas.openxmlformats.org/drawingml/2006/main" xmlns:r="http://schemas.openxmlformats.org/officeDocument/2006/relationships" xmlns:p="http://schemas.openxmlformats.org/presentationml/2006/main">
+  <p:cSld>
+    <p:spTree>
+      <p:nvGrpSpPr>
+        <p:cNvPr id="1" name=""/>
+        <p:cNvGrpSpPr/>
+        <p:nvPr/>
+      </p:nvGrpSpPr>
+      <p:grpSpPr>
+        <a:xfrm>
+          <a:off x="0" y="0"/>
+          <a:ext cx="0" cy="0"/>
+          <a:chOff x="0" y="0"/>
+          <a:chExt cx="0" cy="0"/>
+        </a:xfrm>
+      </p:grpSpPr>
+      <p:sp>
+        <p:nvSpPr>
+          <p:cNvPr id="9" name="Oval 8"/>
+          <p:cNvSpPr/>
+          <p:nvPr/>
+        </p:nvSpPr>
+        <p:spPr>
+          <a:xfrm>
+            <a:off x="5226594" y="936430"/>
+            <a:ext cx="363025" cy="371959"/>
+          </a:xfrm>
+          <a:prstGeom prst="ellipse">
+            <a:avLst/>
+          </a:prstGeom>
+          <a:noFill/>
+          <a:ln w="57150">
+            <a:solidFill>
+              <a:schemeClr val="tx1"/>
+            </a:solidFill>
+          </a:ln>
+        </p:spPr>
+        <p:style>
+          <a:lnRef idx="2">
+            <a:schemeClr val="accent1">
+              <a:shade val="50000"/>
+            </a:schemeClr>
+          </a:lnRef>
+          <a:fillRef idx="1">
+            <a:schemeClr val="accent1"/>
+          </a:fillRef>
+          <a:effectRef idx="0">
+            <a:schemeClr val="accent1"/>
+          </a:effectRef>
+          <a:fontRef idx="minor">
+            <a:schemeClr val="lt1"/>
+          </a:fontRef>
+        </p:style>
+        <p:txBody>
+          <a:bodyPr rtlCol="0" anchor="ctr"/>
+          <a:lstStyle/>
+          <a:p>
+            <a:pPr algn="ctr"/>
+            <a:endParaRPr lang="en-US"/>
+          </a:p>
+        </p:txBody>
+      </p:sp>
+      <p:sp>
+        <p:nvSpPr>
+          <p:cNvPr id="10" name="Oval 9"/>
+          <p:cNvSpPr/>
+          <p:nvPr/>
+        </p:nvSpPr>
+        <p:spPr>
+          <a:xfrm>
+            <a:off x="5239141" y="1745052"/>
+            <a:ext cx="363025" cy="371959"/>
+          </a:xfrm>
+          <a:prstGeom prst="ellipse">
+            <a:avLst/>
+          </a:prstGeom>
+          <a:noFill/>
+          <a:ln w="57150">
+            <a:solidFill>
+              <a:schemeClr val="tx1"/>
+            </a:solidFill>
+          </a:ln>
+        </p:spPr>
+        <p:style>
+          <a:lnRef idx="2">
+            <a:schemeClr val="accent1">
+              <a:shade val="50000"/>
+            </a:schemeClr>
+          </a:lnRef>
+          <a:fillRef idx="1">
+            <a:schemeClr val="accent1"/>
+          </a:fillRef>
+          <a:effectRef idx="0">
+            <a:schemeClr val="accent1"/>
+          </a:effectRef>
+          <a:fontRef idx="minor">
+            <a:schemeClr val="lt1"/>
+          </a:fontRef>
+        </p:style>
+        <p:txBody>
+          <a:bodyPr rtlCol="0" anchor="ctr"/>
+          <a:lstStyle/>
+          <a:p>
+            <a:pPr algn="ctr"/>
+            <a:endParaRPr lang="en-US"/>
+          </a:p>
+        </p:txBody>
+      </p:sp>
+      <p:sp>
+        <p:nvSpPr>
+          <p:cNvPr id="11" name="Oval 10"/>
+          <p:cNvSpPr/>
+          <p:nvPr/>
+        </p:nvSpPr>
+        <p:spPr>
+          <a:xfrm>
+            <a:off x="5239144" y="2605659"/>
+            <a:ext cx="363025" cy="371959"/>
+          </a:xfrm>
+          <a:prstGeom prst="ellipse">
+            <a:avLst/>
+          </a:prstGeom>
+          <a:noFill/>
+          <a:ln w="57150">
+            <a:solidFill>
+              <a:schemeClr val="tx1"/>
+            </a:solidFill>
+          </a:ln>
+        </p:spPr>
+        <p:style>
+          <a:lnRef idx="2">
+            <a:schemeClr val="accent1">
+              <a:shade val="50000"/>
+            </a:schemeClr>
+          </a:lnRef>
+          <a:fillRef idx="1">
+            <a:schemeClr val="accent1"/>
+          </a:fillRef>
+          <a:effectRef idx="0">
+            <a:schemeClr val="accent1"/>
+          </a:effectRef>
+          <a:fontRef idx="minor">
+            <a:schemeClr val="lt1"/>
+          </a:fontRef>
+        </p:style>
+        <p:txBody>
+          <a:bodyPr rtlCol="0" anchor="ctr"/>
+          <a:lstStyle/>
+          <a:p>
+            <a:pPr algn="ctr"/>
+            <a:endParaRPr lang="en-US"/>
+          </a:p>
+        </p:txBody>
+      </p:sp>
+      <p:sp>
+        <p:nvSpPr>
+          <p:cNvPr id="12" name="Oval 11"/>
+          <p:cNvSpPr/>
+          <p:nvPr/>
+        </p:nvSpPr>
+        <p:spPr>
+          <a:xfrm>
+            <a:off x="5251692" y="3446552"/>
+            <a:ext cx="363025" cy="371959"/>
+          </a:xfrm>
+          <a:prstGeom prst="ellipse">
+            <a:avLst/>
+          </a:prstGeom>
+          <a:noFill/>
+          <a:ln w="57150">
+            <a:solidFill>
+              <a:schemeClr val="tx1"/>
+            </a:solidFill>
+          </a:ln>
+        </p:spPr>
+        <p:style>
+          <a:lnRef idx="2">
+            <a:schemeClr val="accent1">
+              <a:shade val="50000"/>
+            </a:schemeClr>
+          </a:lnRef>
+          <a:fillRef idx="1">
+            <a:schemeClr val="accent1"/>
+          </a:fillRef>
+          <a:effectRef idx="0">
+            <a:schemeClr val="accent1"/>
+          </a:effectRef>
+          <a:fontRef idx="minor">
+            <a:schemeClr val="lt1"/>
+          </a:fontRef>
+        </p:style>
+        <p:txBody>
+          <a:bodyPr rtlCol="0" anchor="ctr"/>
+          <a:lstStyle/>
+          <a:p>
+            <a:pPr algn="ctr"/>
+            <a:endParaRPr lang="en-US"/>
+          </a:p>
+        </p:txBody>
+      </p:sp>
+      <p:sp>
+        <p:nvSpPr>
+          <p:cNvPr id="13" name="Oval 12"/>
+          <p:cNvSpPr/>
+          <p:nvPr/>
+        </p:nvSpPr>
+        <p:spPr>
+          <a:xfrm>
+            <a:off x="5262451" y="4221105"/>
+            <a:ext cx="363025" cy="371959"/>
+          </a:xfrm>
+          <a:prstGeom prst="ellipse">
+            <a:avLst/>
+          </a:prstGeom>
+          <a:noFill/>
+          <a:ln w="57150">
+            <a:solidFill>
+              <a:schemeClr val="tx1"/>
+            </a:solidFill>
+          </a:ln>
+        </p:spPr>
+        <p:style>
+          <a:lnRef idx="2">
+            <a:schemeClr val="accent1">
+              <a:shade val="50000"/>
+            </a:schemeClr>
+          </a:lnRef>
+          <a:fillRef idx="1">
+            <a:schemeClr val="accent1"/>
+          </a:fillRef>
+          <a:effectRef idx="0">
+            <a:schemeClr val="accent1"/>
+          </a:effectRef>
+          <a:fontRef idx="minor">
+            <a:schemeClr val="lt1"/>
+          </a:fontRef>
+        </p:style>
+        <p:txBody>
+          <a:bodyPr rtlCol="0" anchor="ctr"/>
+          <a:lstStyle/>
+          <a:p>
+            <a:pPr algn="ctr"/>
+            <a:endParaRPr lang="en-US"/>
+          </a:p>
+        </p:txBody>
+      </p:sp>
+      <p:sp>
+        <p:nvSpPr>
+          <p:cNvPr id="14" name="Oval 13"/>
+          <p:cNvSpPr/>
+          <p:nvPr/>
+        </p:nvSpPr>
+        <p:spPr>
+          <a:xfrm>
+            <a:off x="5274999" y="5061998"/>
+            <a:ext cx="363025" cy="371959"/>
+          </a:xfrm>
+          <a:prstGeom prst="ellipse">
+            <a:avLst/>
+          </a:prstGeom>
+          <a:noFill/>
+          <a:ln w="57150">
+            <a:solidFill>
+              <a:schemeClr val="tx1"/>
+            </a:solidFill>
+          </a:ln>
+        </p:spPr>
+        <p:style>
+          <a:lnRef idx="2">
+            <a:schemeClr val="accent1">
+              <a:shade val="50000"/>
+            </a:schemeClr>
+          </a:lnRef>
+          <a:fillRef idx="1">
+            <a:schemeClr val="accent1"/>
+          </a:fillRef>
+          <a:effectRef idx="0">
+            <a:schemeClr val="accent1"/>
+          </a:effectRef>
+          <a:fontRef idx="minor">
+            <a:schemeClr val="lt1"/>
+          </a:fontRef>
+        </p:style>
+        <p:txBody>
+          <a:bodyPr rtlCol="0" anchor="ctr"/>
+          <a:lstStyle/>
+          <a:p>
+            <a:pPr algn="ctr"/>
+            <a:endParaRPr lang="en-US"/>
+          </a:p>
+        </p:txBody>
+      </p:sp>
+      <p:sp>
+        <p:nvSpPr>
+          <p:cNvPr id="15" name="Oval 14"/>
+          <p:cNvSpPr/>
+          <p:nvPr/>
+        </p:nvSpPr>
+        <p:spPr>
+          <a:xfrm>
+            <a:off x="10136958" y="938220"/>
+            <a:ext cx="363025" cy="371959"/>
+          </a:xfrm>
+          <a:prstGeom prst="ellipse">
+            <a:avLst/>
+          </a:prstGeom>
+          <a:noFill/>
+          <a:ln w="57150">
+            <a:solidFill>
+              <a:schemeClr val="tx1"/>
+            </a:solidFill>
+          </a:ln>
+        </p:spPr>
+        <p:style>
+          <a:lnRef idx="2">
+            <a:schemeClr val="accent1">
+              <a:shade val="50000"/>
+            </a:schemeClr>
+          </a:lnRef>
+          <a:fillRef idx="1">
+            <a:schemeClr val="accent1"/>
+          </a:fillRef>
+          <a:effectRef idx="0">
+            <a:schemeClr val="accent1"/>
+          </a:effectRef>
+          <a:fontRef idx="minor">
+            <a:schemeClr val="lt1"/>
+          </a:fontRef>
+        </p:style>
+        <p:txBody>
+          <a:bodyPr rtlCol="0" anchor="ctr"/>
+          <a:lstStyle/>
+          <a:p>
+            <a:pPr algn="ctr"/>
+            <a:endParaRPr lang="en-US"/>
+          </a:p>
+        </p:txBody>
+      </p:sp>
+      <p:sp>
+        <p:nvSpPr>
+          <p:cNvPr id="16" name="Oval 15"/>
+          <p:cNvSpPr/>
+          <p:nvPr/>
+        </p:nvSpPr>
+        <p:spPr>
+          <a:xfrm>
+            <a:off x="10149505" y="1746842"/>
+            <a:ext cx="363025" cy="371959"/>
+          </a:xfrm>
+          <a:prstGeom prst="ellipse">
+            <a:avLst/>
+          </a:prstGeom>
+          <a:noFill/>
+          <a:ln w="57150">
+            <a:solidFill>
+              <a:schemeClr val="tx1"/>
+            </a:solidFill>
+          </a:ln>
+        </p:spPr>
+        <p:style>
+          <a:lnRef idx="2">
+            <a:schemeClr val="accent1">
+              <a:shade val="50000"/>
+            </a:schemeClr>
+          </a:lnRef>
+          <a:fillRef idx="1">
+            <a:schemeClr val="accent1"/>
+          </a:fillRef>
+          <a:effectRef idx="0">
+            <a:schemeClr val="accent1"/>
+          </a:effectRef>
+          <a:fontRef idx="minor">
+            <a:schemeClr val="lt1"/>
+          </a:fontRef>
+        </p:style>
+        <p:txBody>
+          <a:bodyPr rtlCol="0" anchor="ctr"/>
+          <a:lstStyle/>
+          <a:p>
+            <a:pPr algn="ctr"/>
+            <a:endParaRPr lang="en-US"/>
+          </a:p>
+        </p:txBody>
+      </p:sp>
+      <p:sp>
+        <p:nvSpPr>
+          <p:cNvPr id="17" name="Oval 16"/>
+          <p:cNvSpPr/>
+          <p:nvPr/>
+        </p:nvSpPr>
+        <p:spPr>
+          <a:xfrm>
+            <a:off x="10149508" y="2607449"/>
+            <a:ext cx="363025" cy="371959"/>
+          </a:xfrm>
+          <a:prstGeom prst="ellipse">
+            <a:avLst/>
+          </a:prstGeom>
+          <a:noFill/>
+          <a:ln w="57150">
+            <a:solidFill>
+              <a:schemeClr val="tx1"/>
+            </a:solidFill>
+          </a:ln>
+        </p:spPr>
+        <p:style>
+          <a:lnRef idx="2">
+            <a:schemeClr val="accent1">
+              <a:shade val="50000"/>
+            </a:schemeClr>
+          </a:lnRef>
+          <a:fillRef idx="1">
+            <a:schemeClr val="accent1"/>
+          </a:fillRef>
+          <a:effectRef idx="0">
+            <a:schemeClr val="accent1"/>
+          </a:effectRef>
+          <a:fontRef idx="minor">
+            <a:schemeClr val="lt1"/>
+          </a:fontRef>
+        </p:style>
+        <p:txBody>
+          <a:bodyPr rtlCol="0" anchor="ctr"/>
+          <a:lstStyle/>
+          <a:p>
+            <a:pPr algn="ctr"/>
+            <a:endParaRPr lang="en-US"/>
+          </a:p>
+        </p:txBody>
+      </p:sp>
+      <p:cxnSp>
+        <p:nvCxnSpPr>
+          <p:cNvPr id="19" name="Straight Arrow Connector 18"/>
+          <p:cNvCxnSpPr/>
+          <p:nvPr/>
+        </p:nvCxnSpPr>
+        <p:spPr>
+          <a:xfrm>
+            <a:off x="11297146" y="2786480"/>
+            <a:ext cx="242748" cy="3344"/>
+          </a:xfrm>
+          <a:prstGeom prst="straightConnector1">
+            <a:avLst/>
+          </a:prstGeom>
+          <a:ln>
+            <a:solidFill>
+              <a:schemeClr val="tx1"/>
+            </a:solidFill>
+            <a:tailEnd type="triangle"/>
+          </a:ln>
+        </p:spPr>
+        <p:style>
+          <a:lnRef idx="1">
+            <a:schemeClr val="accent1"/>
+          </a:lnRef>
+          <a:fillRef idx="0">
+            <a:schemeClr val="accent1"/>
+          </a:fillRef>
+          <a:effectRef idx="0">
+            <a:schemeClr val="accent1"/>
+          </a:effectRef>
+          <a:fontRef idx="minor">
+            <a:schemeClr val="tx1"/>
+          </a:fontRef>
+        </p:style>
+      </p:cxnSp>
+      <p:sp>
+        <p:nvSpPr>
+          <p:cNvPr id="20" name="TextBox 19"/>
+          <p:cNvSpPr txBox="1"/>
+          <p:nvPr/>
+        </p:nvSpPr>
+        <p:spPr>
+          <a:xfrm>
+            <a:off x="11539890" y="2596187"/>
+            <a:ext cx="512961" cy="369332"/>
+          </a:xfrm>
+          <a:prstGeom prst="rect">
+            <a:avLst/>
+          </a:prstGeom>
+          <a:noFill/>
+        </p:spPr>
+        <p:txBody>
+          <a:bodyPr wrap="none" rtlCol="0">
+            <a:spAutoFit/>
+          </a:bodyPr>
+          <a:lstStyle/>
+          <a:p>
+            <a:r>
+              <a:rPr lang="en-US" dirty="0" err="1" smtClean="0"/>
+              <a:t>aco</a:t>
+            </a:r>
+            <a:endParaRPr lang="en-US" dirty="0"/>
+          </a:p>
+        </p:txBody>
+      </p:sp>
+      <p:sp>
+        <p:nvSpPr>
+          <p:cNvPr id="22" name="TextBox 21"/>
+          <p:cNvSpPr txBox="1"/>
+          <p:nvPr/>
+        </p:nvSpPr>
+        <p:spPr>
+          <a:xfrm>
+            <a:off x="10793006" y="2599772"/>
+            <a:ext cx="636713" cy="369332"/>
+          </a:xfrm>
+          <a:prstGeom prst="rect">
+            <a:avLst/>
+          </a:prstGeom>
+          <a:noFill/>
+        </p:spPr>
+        <p:txBody>
+          <a:bodyPr wrap="none" rtlCol="0">
+            <a:spAutoFit/>
+          </a:bodyPr>
+          <a:lstStyle/>
+          <a:p>
+            <a:r>
+              <a:rPr lang="en-US" i="1" dirty="0" smtClean="0">
+                <a:latin typeface="Times New Roman" panose="02020603050405020304" pitchFamily="18" charset="0"/>
+                <a:cs typeface="Times New Roman" panose="02020603050405020304" pitchFamily="18" charset="0"/>
+                <a:sym typeface="Symbol" panose="05050102010706020507" pitchFamily="18" charset="2"/>
+              </a:rPr>
+              <a:t>(</a:t>
+            </a:r>
+            <a:r>
+              <a:rPr lang="en-US" i="1" dirty="0" err="1" smtClean="0">
+                <a:latin typeface="Times New Roman" panose="02020603050405020304" pitchFamily="18" charset="0"/>
+                <a:cs typeface="Times New Roman" panose="02020603050405020304" pitchFamily="18" charset="0"/>
+              </a:rPr>
+              <a:t>z</a:t>
+            </a:r>
+            <a:r>
+              <a:rPr lang="en-US" i="1" baseline="-25000" dirty="0" err="1" smtClean="0">
+                <a:latin typeface="Times New Roman" panose="02020603050405020304" pitchFamily="18" charset="0"/>
+                <a:cs typeface="Times New Roman" panose="02020603050405020304" pitchFamily="18" charset="0"/>
+              </a:rPr>
+              <a:t>k</a:t>
+            </a:r>
+            <a:r>
+              <a:rPr lang="en-US" i="1" dirty="0" smtClean="0">
+                <a:latin typeface="Times New Roman" panose="02020603050405020304" pitchFamily="18" charset="0"/>
+                <a:cs typeface="Times New Roman" panose="02020603050405020304" pitchFamily="18" charset="0"/>
+              </a:rPr>
+              <a:t>)</a:t>
+            </a:r>
+            <a:endParaRPr lang="en-US" i="1" dirty="0">
+              <a:latin typeface="Times New Roman" panose="02020603050405020304" pitchFamily="18" charset="0"/>
+              <a:cs typeface="Times New Roman" panose="02020603050405020304" pitchFamily="18" charset="0"/>
+            </a:endParaRPr>
+          </a:p>
+        </p:txBody>
+      </p:sp>
+      <mc:AlternateContent xmlns:mc="http://schemas.openxmlformats.org/markup-compatibility/2006">
+        <mc:Choice xmlns:a14="http://schemas.microsoft.com/office/drawing/2010/main" Requires="a14">
+          <p:sp>
+            <p:nvSpPr>
+              <p:cNvPr id="24" name="TextBox 23"/>
+              <p:cNvSpPr txBox="1"/>
+              <p:nvPr/>
+            </p:nvSpPr>
+            <p:spPr>
+              <a:xfrm>
+                <a:off x="7802614" y="2417823"/>
+                <a:ext cx="2101409" cy="809517"/>
+              </a:xfrm>
+              <a:prstGeom prst="rect">
+                <a:avLst/>
+              </a:prstGeom>
+              <a:noFill/>
+            </p:spPr>
+            <p:txBody>
+              <a:bodyPr wrap="none" lIns="0" tIns="0" rIns="0" bIns="0" rtlCol="0">
+                <a:spAutoFit/>
+              </a:bodyPr>
+              <a:lstStyle/>
+              <a:p>
+                <a:pPr/>
+                <a14:m>
+                  <m:oMathPara xmlns:m="http://schemas.openxmlformats.org/officeDocument/2006/math">
+                    <m:oMathParaPr>
+                      <m:jc m:val="centerGroup"/>
+                    </m:oMathParaPr>
+                    <m:oMath xmlns:m="http://schemas.openxmlformats.org/officeDocument/2006/math">
+                      <m:r>
+                        <a:rPr lang="en-US" b="0" i="1" smtClean="0">
+                          <a:latin typeface="Cambria Math" panose="02040503050406030204" pitchFamily="18" charset="0"/>
+                        </a:rPr>
+                        <m:t>𝑧</m:t>
+                      </m:r>
+                      <m:r>
+                        <a:rPr lang="en-US" b="0" i="1" baseline="-25000" smtClean="0">
+                          <a:latin typeface="Cambria Math" panose="02040503050406030204" pitchFamily="18" charset="0"/>
+                        </a:rPr>
+                        <m:t>𝑘</m:t>
+                      </m:r>
+                      <m:r>
+                        <a:rPr lang="en-US" b="0" i="1" smtClean="0">
+                          <a:latin typeface="Cambria Math" panose="02040503050406030204" pitchFamily="18" charset="0"/>
+                        </a:rPr>
+                        <m:t>=</m:t>
+                      </m:r>
+                      <m:r>
+                        <a:rPr lang="en-US" b="0" i="1" smtClean="0">
+                          <a:latin typeface="Cambria Math" panose="02040503050406030204" pitchFamily="18" charset="0"/>
+                        </a:rPr>
+                        <m:t>𝑏𝑘</m:t>
+                      </m:r>
+                      <m:r>
+                        <a:rPr lang="en-US" b="0" i="1" smtClean="0">
+                          <a:latin typeface="Cambria Math" panose="02040503050406030204" pitchFamily="18" charset="0"/>
+                        </a:rPr>
+                        <m:t>+ </m:t>
+                      </m:r>
+                      <m:nary>
+                        <m:naryPr>
+                          <m:chr m:val="∑"/>
+                          <m:ctrlPr>
+                            <a:rPr lang="pt-BR" i="1" smtClean="0">
+                              <a:latin typeface="Cambria Math" panose="02040503050406030204" pitchFamily="18" charset="0"/>
+                            </a:rPr>
+                          </m:ctrlPr>
+                        </m:naryPr>
+                        <m:sub>
+                          <m:r>
+                            <a:rPr lang="en-US" b="0" i="1" smtClean="0">
+                              <a:latin typeface="Cambria Math" panose="02040503050406030204" pitchFamily="18" charset="0"/>
+                            </a:rPr>
+                            <m:t>𝑗</m:t>
+                          </m:r>
+                          <m:r>
+                            <a:rPr lang="pt-BR" i="1" smtClean="0">
+                              <a:latin typeface="Cambria Math" panose="02040503050406030204" pitchFamily="18" charset="0"/>
+                            </a:rPr>
+                            <m:t>=0</m:t>
+                          </m:r>
+                        </m:sub>
+                        <m:sup>
+                          <m:r>
+                            <a:rPr lang="en-US" b="0" i="1" smtClean="0">
+                              <a:latin typeface="Cambria Math" panose="02040503050406030204" pitchFamily="18" charset="0"/>
+                            </a:rPr>
+                            <m:t>𝑠</m:t>
+                          </m:r>
+                          <m:r>
+                            <a:rPr lang="en-US" b="0" i="1" smtClean="0">
+                              <a:latin typeface="Cambria Math" panose="02040503050406030204" pitchFamily="18" charset="0"/>
+                            </a:rPr>
+                            <m:t>−1</m:t>
+                          </m:r>
+                        </m:sup>
+                        <m:e>
+                          <m:r>
+                            <a:rPr lang="en-US" b="0" i="1" smtClean="0">
+                              <a:latin typeface="Cambria Math" panose="02040503050406030204" pitchFamily="18" charset="0"/>
+                            </a:rPr>
+                            <m:t>𝑦</m:t>
+                          </m:r>
+                          <m:r>
+                            <a:rPr lang="en-US" b="0" i="1" baseline="-25000" smtClean="0">
+                              <a:latin typeface="Cambria Math" panose="02040503050406030204" pitchFamily="18" charset="0"/>
+                            </a:rPr>
+                            <m:t>𝑗</m:t>
+                          </m:r>
+                          <m:r>
+                            <a:rPr lang="en-US" b="0" i="1" smtClean="0">
+                              <a:latin typeface="Cambria Math" panose="02040503050406030204" pitchFamily="18" charset="0"/>
+                            </a:rPr>
+                            <m:t>𝑤</m:t>
+                          </m:r>
+                          <m:r>
+                            <a:rPr lang="en-US" b="0" i="1" baseline="-25000" smtClean="0">
+                              <a:latin typeface="Cambria Math" panose="02040503050406030204" pitchFamily="18" charset="0"/>
+                            </a:rPr>
+                            <m:t>𝑗</m:t>
+                          </m:r>
+                          <m:r>
+                            <a:rPr lang="en-US" b="0" i="1" baseline="-25000" smtClean="0">
+                              <a:latin typeface="Cambria Math" panose="02040503050406030204" pitchFamily="18" charset="0"/>
+                            </a:rPr>
+                            <m:t>,</m:t>
+                          </m:r>
+                          <m:r>
+                            <a:rPr lang="en-US" b="0" i="1" baseline="-25000" smtClean="0">
+                              <a:latin typeface="Cambria Math" panose="02040503050406030204" pitchFamily="18" charset="0"/>
+                            </a:rPr>
+                            <m:t>𝑘</m:t>
+                          </m:r>
+                        </m:e>
+                      </m:nary>
+                    </m:oMath>
+                  </m:oMathPara>
+                </a14:m>
+                <a:endParaRPr lang="en-US" i="1" dirty="0">
+                  <a:latin typeface="Times New Roman" panose="02020603050405020304" pitchFamily="18" charset="0"/>
+                  <a:cs typeface="Times New Roman" panose="02020603050405020304" pitchFamily="18" charset="0"/>
+                </a:endParaRPr>
+              </a:p>
+            </p:txBody>
+          </p:sp>
+        </mc:Choice>
+        <mc:Fallback>
+          <p:sp>
+            <p:nvSpPr>
+              <p:cNvPr id="24" name="TextBox 23"/>
+              <p:cNvSpPr txBox="1">
+                <a:spLocks noRot="1" noChangeAspect="1" noMove="1" noResize="1" noEditPoints="1" noAdjustHandles="1" noChangeArrowheads="1" noChangeShapeType="1" noTextEdit="1"/>
+              </p:cNvSpPr>
+              <p:nvPr/>
+            </p:nvSpPr>
+            <p:spPr>
+              <a:xfrm>
+                <a:off x="7802614" y="2417823"/>
+                <a:ext cx="2101409" cy="809517"/>
+              </a:xfrm>
+              <a:prstGeom prst="rect">
+                <a:avLst/>
+              </a:prstGeom>
+              <a:blipFill rotWithShape="0">
+                <a:blip r:embed="rId2"/>
+                <a:stretch>
+                  <a:fillRect/>
+                </a:stretch>
+              </a:blipFill>
+            </p:spPr>
+            <p:txBody>
+              <a:bodyPr/>
+              <a:lstStyle/>
+              <a:p>
+                <a:r>
+                  <a:rPr lang="en-US">
+                    <a:noFill/>
+                  </a:rPr>
+                  <a:t> </a:t>
+                </a:r>
+              </a:p>
+            </p:txBody>
+          </p:sp>
+        </mc:Fallback>
+      </mc:AlternateContent>
+      <p:sp>
+        <p:nvSpPr>
+          <p:cNvPr id="35" name="TextBox 34"/>
+          <p:cNvSpPr txBox="1"/>
+          <p:nvPr/>
+        </p:nvSpPr>
+        <p:spPr>
+          <a:xfrm>
+            <a:off x="6637736" y="3472925"/>
+            <a:ext cx="330540" cy="369332"/>
+          </a:xfrm>
+          <a:prstGeom prst="rect">
+            <a:avLst/>
+          </a:prstGeom>
+          <a:noFill/>
+        </p:spPr>
+        <p:txBody>
+          <a:bodyPr wrap="none" rtlCol="0">
+            <a:spAutoFit/>
+          </a:bodyPr>
+          <a:lstStyle/>
+          <a:p>
+            <a:r>
+              <a:rPr lang="en-US" i="1" dirty="0" err="1" smtClean="0">
+                <a:latin typeface="Times New Roman" panose="02020603050405020304" pitchFamily="18" charset="0"/>
+                <a:ea typeface="Cambria Math" panose="02040503050406030204" pitchFamily="18" charset="0"/>
+                <a:cs typeface="Times New Roman" panose="02020603050405020304" pitchFamily="18" charset="0"/>
+                <a:sym typeface="Symbol" panose="05050102010706020507" pitchFamily="18" charset="2"/>
+              </a:rPr>
+              <a:t>y</a:t>
+            </a:r>
+            <a:r>
+              <a:rPr lang="en-US" i="1" baseline="-25000" dirty="0" err="1" smtClean="0">
+                <a:latin typeface="Times New Roman" panose="02020603050405020304" pitchFamily="18" charset="0"/>
+                <a:ea typeface="Cambria Math" panose="02040503050406030204" pitchFamily="18" charset="0"/>
+                <a:cs typeface="Times New Roman" panose="02020603050405020304" pitchFamily="18" charset="0"/>
+                <a:sym typeface="Symbol" panose="05050102010706020507" pitchFamily="18" charset="2"/>
+              </a:rPr>
+              <a:t>j</a:t>
+            </a:r>
+            <a:endParaRPr lang="en-US" i="1" baseline="-25000" dirty="0">
+              <a:latin typeface="Times New Roman" panose="02020603050405020304" pitchFamily="18" charset="0"/>
+              <a:ea typeface="Cambria Math" panose="02040503050406030204" pitchFamily="18" charset="0"/>
+              <a:cs typeface="Times New Roman" panose="02020603050405020304" pitchFamily="18" charset="0"/>
+            </a:endParaRPr>
+          </a:p>
+        </p:txBody>
+      </p:sp>
+      <p:cxnSp>
+        <p:nvCxnSpPr>
+          <p:cNvPr id="36" name="Straight Arrow Connector 35"/>
+          <p:cNvCxnSpPr>
+            <a:stCxn id="35" idx="3"/>
+            <a:endCxn id="24" idx="1"/>
+          </p:cNvCxnSpPr>
+          <p:nvPr/>
+        </p:nvCxnSpPr>
+        <p:spPr>
+          <a:xfrm flipV="1">
+            <a:off x="6968276" y="2822582"/>
+            <a:ext cx="834338" cy="835009"/>
+          </a:xfrm>
+          <a:prstGeom prst="straightConnector1">
+            <a:avLst/>
+          </a:prstGeom>
+          <a:ln>
+            <a:solidFill>
+              <a:schemeClr val="tx1"/>
+            </a:solidFill>
+            <a:tailEnd type="triangle"/>
+          </a:ln>
+        </p:spPr>
+        <p:style>
+          <a:lnRef idx="1">
+            <a:schemeClr val="accent1"/>
+          </a:lnRef>
+          <a:fillRef idx="0">
+            <a:schemeClr val="accent1"/>
+          </a:fillRef>
+          <a:effectRef idx="0">
+            <a:schemeClr val="accent1"/>
+          </a:effectRef>
+          <a:fontRef idx="minor">
+            <a:schemeClr val="tx1"/>
+          </a:fontRef>
+        </p:style>
+      </p:cxnSp>
+      <p:sp>
+        <p:nvSpPr>
+          <p:cNvPr id="38" name="TextBox 37"/>
+          <p:cNvSpPr txBox="1"/>
+          <p:nvPr/>
+        </p:nvSpPr>
+        <p:spPr>
+          <a:xfrm>
+            <a:off x="7209164" y="3204751"/>
+            <a:ext cx="489236" cy="369332"/>
+          </a:xfrm>
+          <a:prstGeom prst="rect">
+            <a:avLst/>
+          </a:prstGeom>
+          <a:noFill/>
+        </p:spPr>
+        <p:txBody>
+          <a:bodyPr wrap="none" rtlCol="0">
+            <a:spAutoFit/>
+          </a:bodyPr>
+          <a:lstStyle/>
+          <a:p>
+            <a:r>
+              <a:rPr lang="en-US" i="1" dirty="0" err="1" smtClean="0">
+                <a:latin typeface="Times New Roman" panose="02020603050405020304" pitchFamily="18" charset="0"/>
+                <a:ea typeface="Cambria Math" panose="02040503050406030204" pitchFamily="18" charset="0"/>
+                <a:cs typeface="Times New Roman" panose="02020603050405020304" pitchFamily="18" charset="0"/>
+                <a:sym typeface="Symbol" panose="05050102010706020507" pitchFamily="18" charset="2"/>
+              </a:rPr>
+              <a:t>w</a:t>
+            </a:r>
+            <a:r>
+              <a:rPr lang="en-US" i="1" baseline="-25000" dirty="0" err="1" smtClean="0">
+                <a:latin typeface="Times New Roman" panose="02020603050405020304" pitchFamily="18" charset="0"/>
+                <a:ea typeface="Cambria Math" panose="02040503050406030204" pitchFamily="18" charset="0"/>
+                <a:cs typeface="Times New Roman" panose="02020603050405020304" pitchFamily="18" charset="0"/>
+                <a:sym typeface="Symbol" panose="05050102010706020507" pitchFamily="18" charset="2"/>
+              </a:rPr>
+              <a:t>j,k</a:t>
+            </a:r>
+            <a:endParaRPr lang="en-US" i="1" baseline="-25000" dirty="0">
+              <a:latin typeface="Times New Roman" panose="02020603050405020304" pitchFamily="18" charset="0"/>
+              <a:ea typeface="Cambria Math" panose="02040503050406030204" pitchFamily="18" charset="0"/>
+              <a:cs typeface="Times New Roman" panose="02020603050405020304" pitchFamily="18" charset="0"/>
+            </a:endParaRPr>
+          </a:p>
+        </p:txBody>
+      </p:sp>
+      <p:sp>
+        <p:nvSpPr>
+          <p:cNvPr id="40" name="TextBox 39"/>
+          <p:cNvSpPr txBox="1"/>
+          <p:nvPr/>
+        </p:nvSpPr>
+        <p:spPr>
+          <a:xfrm>
+            <a:off x="4872693" y="5540188"/>
+            <a:ext cx="2398955" cy="707886"/>
+          </a:xfrm>
+          <a:prstGeom prst="rect">
+            <a:avLst/>
+          </a:prstGeom>
+          <a:noFill/>
+        </p:spPr>
+        <p:txBody>
+          <a:bodyPr wrap="square" rtlCol="0">
+            <a:spAutoFit/>
+          </a:bodyPr>
+          <a:lstStyle/>
+          <a:p>
+            <a:r>
+              <a:rPr lang="en-US" sz="2000" i="1" dirty="0" smtClean="0">
+                <a:latin typeface="Times New Roman" panose="02020603050405020304" pitchFamily="18" charset="0"/>
+                <a:cs typeface="Times New Roman" panose="02020603050405020304" pitchFamily="18" charset="0"/>
+              </a:rPr>
+              <a:t>s</a:t>
+            </a:r>
+            <a:r>
+              <a:rPr lang="en-US" sz="2000" dirty="0" smtClean="0"/>
+              <a:t> Hidden Layer</a:t>
+            </a:r>
+          </a:p>
+          <a:p>
+            <a:r>
+              <a:rPr lang="en-US" sz="2000" dirty="0">
+                <a:latin typeface="Times New Roman" panose="02020603050405020304" pitchFamily="18" charset="0"/>
+                <a:cs typeface="Times New Roman" panose="02020603050405020304" pitchFamily="18" charset="0"/>
+              </a:rPr>
+              <a:t>0</a:t>
+            </a:r>
+            <a:r>
+              <a:rPr lang="en-US" sz="2000" dirty="0"/>
+              <a:t> </a:t>
+            </a:r>
+            <a:r>
+              <a:rPr lang="en-US" sz="2000" dirty="0">
+                <a:sym typeface="Symbol" panose="05050102010706020507" pitchFamily="18" charset="2"/>
+              </a:rPr>
+              <a:t> </a:t>
+            </a:r>
+            <a:r>
+              <a:rPr lang="en-US" sz="2000" i="1" dirty="0" smtClean="0">
+                <a:latin typeface="Times New Roman" panose="02020603050405020304" pitchFamily="18" charset="0"/>
+                <a:cs typeface="Times New Roman" panose="02020603050405020304" pitchFamily="18" charset="0"/>
+                <a:sym typeface="Symbol" panose="05050102010706020507" pitchFamily="18" charset="2"/>
+              </a:rPr>
+              <a:t>j</a:t>
+            </a:r>
+            <a:r>
+              <a:rPr lang="en-US" sz="2000" dirty="0" smtClean="0">
+                <a:sym typeface="Symbol" panose="05050102010706020507" pitchFamily="18" charset="2"/>
+              </a:rPr>
+              <a:t> </a:t>
+            </a:r>
+            <a:r>
+              <a:rPr lang="en-US" sz="2000" dirty="0">
+                <a:sym typeface="Symbol" panose="05050102010706020507" pitchFamily="18" charset="2"/>
+              </a:rPr>
+              <a:t> </a:t>
+            </a:r>
+            <a:r>
+              <a:rPr lang="en-US" sz="2000" i="1" dirty="0" smtClean="0">
+                <a:latin typeface="Times New Roman" panose="02020603050405020304" pitchFamily="18" charset="0"/>
+                <a:cs typeface="Times New Roman" panose="02020603050405020304" pitchFamily="18" charset="0"/>
+                <a:sym typeface="Symbol" panose="05050102010706020507" pitchFamily="18" charset="2"/>
+              </a:rPr>
+              <a:t>s</a:t>
+            </a:r>
+            <a:endParaRPr lang="en-US" sz="2000" i="1" dirty="0">
+              <a:latin typeface="Times New Roman" panose="02020603050405020304" pitchFamily="18" charset="0"/>
+              <a:cs typeface="Times New Roman" panose="02020603050405020304" pitchFamily="18" charset="0"/>
+            </a:endParaRPr>
+          </a:p>
+        </p:txBody>
+      </p:sp>
+      <p:sp>
+        <p:nvSpPr>
+          <p:cNvPr id="41" name="TextBox 40"/>
+          <p:cNvSpPr txBox="1"/>
+          <p:nvPr/>
+        </p:nvSpPr>
+        <p:spPr>
+          <a:xfrm>
+            <a:off x="9702125" y="5056354"/>
+            <a:ext cx="2398955" cy="707886"/>
+          </a:xfrm>
+          <a:prstGeom prst="rect">
+            <a:avLst/>
+          </a:prstGeom>
+          <a:noFill/>
+        </p:spPr>
+        <p:txBody>
+          <a:bodyPr wrap="square" rtlCol="0">
+            <a:spAutoFit/>
+          </a:bodyPr>
+          <a:lstStyle/>
+          <a:p>
+            <a:r>
+              <a:rPr lang="en-US" sz="2000" i="1" dirty="0" smtClean="0">
+                <a:latin typeface="Times New Roman" panose="02020603050405020304" pitchFamily="18" charset="0"/>
+                <a:cs typeface="Times New Roman" panose="02020603050405020304" pitchFamily="18" charset="0"/>
+              </a:rPr>
+              <a:t>t</a:t>
+            </a:r>
+            <a:r>
+              <a:rPr lang="en-US" sz="2000" dirty="0" smtClean="0"/>
+              <a:t> Output Layer</a:t>
+            </a:r>
+          </a:p>
+          <a:p>
+            <a:r>
+              <a:rPr lang="en-US" sz="2000" dirty="0">
+                <a:latin typeface="Times New Roman" panose="02020603050405020304" pitchFamily="18" charset="0"/>
+                <a:cs typeface="Times New Roman" panose="02020603050405020304" pitchFamily="18" charset="0"/>
+              </a:rPr>
+              <a:t>0</a:t>
+            </a:r>
+            <a:r>
+              <a:rPr lang="en-US" sz="2000" dirty="0"/>
+              <a:t> </a:t>
+            </a:r>
+            <a:r>
+              <a:rPr lang="en-US" sz="2000" dirty="0">
+                <a:sym typeface="Symbol" panose="05050102010706020507" pitchFamily="18" charset="2"/>
+              </a:rPr>
+              <a:t> </a:t>
+            </a:r>
+            <a:r>
+              <a:rPr lang="en-US" sz="2000" i="1" dirty="0" smtClean="0">
+                <a:latin typeface="Times New Roman" panose="02020603050405020304" pitchFamily="18" charset="0"/>
+                <a:cs typeface="Times New Roman" panose="02020603050405020304" pitchFamily="18" charset="0"/>
+                <a:sym typeface="Symbol" panose="05050102010706020507" pitchFamily="18" charset="2"/>
+              </a:rPr>
+              <a:t>k</a:t>
+            </a:r>
+            <a:r>
+              <a:rPr lang="en-US" sz="2000" dirty="0" smtClean="0">
+                <a:sym typeface="Symbol" panose="05050102010706020507" pitchFamily="18" charset="2"/>
+              </a:rPr>
+              <a:t> </a:t>
+            </a:r>
+            <a:r>
+              <a:rPr lang="en-US" sz="2000" dirty="0">
+                <a:sym typeface="Symbol" panose="05050102010706020507" pitchFamily="18" charset="2"/>
+              </a:rPr>
+              <a:t> </a:t>
+            </a:r>
+            <a:r>
+              <a:rPr lang="en-US" sz="2000" i="1" dirty="0" smtClean="0">
+                <a:latin typeface="Times New Roman" panose="02020603050405020304" pitchFamily="18" charset="0"/>
+                <a:cs typeface="Times New Roman" panose="02020603050405020304" pitchFamily="18" charset="0"/>
+                <a:sym typeface="Symbol" panose="05050102010706020507" pitchFamily="18" charset="2"/>
+              </a:rPr>
+              <a:t>t</a:t>
+            </a:r>
+            <a:endParaRPr lang="en-US" sz="2000" i="1" dirty="0">
+              <a:latin typeface="Times New Roman" panose="02020603050405020304" pitchFamily="18" charset="0"/>
+              <a:cs typeface="Times New Roman" panose="02020603050405020304" pitchFamily="18" charset="0"/>
+            </a:endParaRPr>
+          </a:p>
+        </p:txBody>
+      </p:sp>
+      <p:cxnSp>
+        <p:nvCxnSpPr>
+          <p:cNvPr id="37" name="Straight Arrow Connector 36"/>
+          <p:cNvCxnSpPr/>
+          <p:nvPr/>
+        </p:nvCxnSpPr>
+        <p:spPr>
+          <a:xfrm>
+            <a:off x="10604812" y="2790829"/>
+            <a:ext cx="242748" cy="3344"/>
+          </a:xfrm>
+          <a:prstGeom prst="straightConnector1">
+            <a:avLst/>
+          </a:prstGeom>
+          <a:ln>
+            <a:solidFill>
+              <a:schemeClr val="tx1"/>
+            </a:solidFill>
+            <a:tailEnd type="triangle"/>
+          </a:ln>
+        </p:spPr>
+        <p:style>
+          <a:lnRef idx="1">
+            <a:schemeClr val="accent1"/>
+          </a:lnRef>
+          <a:fillRef idx="0">
+            <a:schemeClr val="accent1"/>
+          </a:fillRef>
+          <a:effectRef idx="0">
+            <a:schemeClr val="accent1"/>
+          </a:effectRef>
+          <a:fontRef idx="minor">
+            <a:schemeClr val="tx1"/>
+          </a:fontRef>
+        </p:style>
+      </p:cxnSp>
+      <p:sp>
+        <p:nvSpPr>
+          <p:cNvPr id="39" name="Oval 38"/>
+          <p:cNvSpPr/>
+          <p:nvPr/>
+        </p:nvSpPr>
+        <p:spPr>
+          <a:xfrm>
+            <a:off x="10171274" y="3466791"/>
+            <a:ext cx="363025" cy="371959"/>
+          </a:xfrm>
+          <a:prstGeom prst="ellipse">
+            <a:avLst/>
+          </a:prstGeom>
+          <a:noFill/>
+          <a:ln w="57150">
+            <a:solidFill>
+              <a:schemeClr val="tx1"/>
+            </a:solidFill>
+          </a:ln>
+        </p:spPr>
+        <p:style>
+          <a:lnRef idx="2">
+            <a:schemeClr val="accent1">
+              <a:shade val="50000"/>
+            </a:schemeClr>
+          </a:lnRef>
+          <a:fillRef idx="1">
+            <a:schemeClr val="accent1"/>
+          </a:fillRef>
+          <a:effectRef idx="0">
+            <a:schemeClr val="accent1"/>
+          </a:effectRef>
+          <a:fontRef idx="minor">
+            <a:schemeClr val="lt1"/>
+          </a:fontRef>
+        </p:style>
+        <p:txBody>
+          <a:bodyPr rtlCol="0" anchor="ctr"/>
+          <a:lstStyle/>
+          <a:p>
+            <a:pPr algn="ctr"/>
+            <a:endParaRPr lang="en-US"/>
+          </a:p>
+        </p:txBody>
+      </p:sp>
+      <p:sp>
+        <p:nvSpPr>
+          <p:cNvPr id="42" name="Oval 41"/>
+          <p:cNvSpPr/>
+          <p:nvPr/>
+        </p:nvSpPr>
+        <p:spPr>
+          <a:xfrm>
+            <a:off x="10171277" y="4327398"/>
+            <a:ext cx="363025" cy="371959"/>
+          </a:xfrm>
+          <a:prstGeom prst="ellipse">
+            <a:avLst/>
+          </a:prstGeom>
+          <a:noFill/>
+          <a:ln w="57150">
+            <a:solidFill>
+              <a:schemeClr val="tx1"/>
+            </a:solidFill>
+          </a:ln>
+        </p:spPr>
+        <p:style>
+          <a:lnRef idx="2">
+            <a:schemeClr val="accent1">
+              <a:shade val="50000"/>
+            </a:schemeClr>
+          </a:lnRef>
+          <a:fillRef idx="1">
+            <a:schemeClr val="accent1"/>
+          </a:fillRef>
+          <a:effectRef idx="0">
+            <a:schemeClr val="accent1"/>
+          </a:effectRef>
+          <a:fontRef idx="minor">
+            <a:schemeClr val="lt1"/>
+          </a:fontRef>
+        </p:style>
+        <p:txBody>
+          <a:bodyPr rtlCol="0" anchor="ctr"/>
+          <a:lstStyle/>
+          <a:p>
+            <a:pPr algn="ctr"/>
+            <a:endParaRPr lang="en-US"/>
+          </a:p>
+        </p:txBody>
+      </p:sp>
+      <p:cxnSp>
+        <p:nvCxnSpPr>
+          <p:cNvPr id="43" name="Straight Arrow Connector 42"/>
+          <p:cNvCxnSpPr/>
+          <p:nvPr/>
+        </p:nvCxnSpPr>
+        <p:spPr>
+          <a:xfrm>
+            <a:off x="9834100" y="2795179"/>
+            <a:ext cx="242748" cy="3344"/>
+          </a:xfrm>
+          <a:prstGeom prst="straightConnector1">
+            <a:avLst/>
+          </a:prstGeom>
+          <a:ln>
+            <a:solidFill>
+              <a:schemeClr val="tx1"/>
+            </a:solidFill>
+            <a:tailEnd type="triangle"/>
+          </a:ln>
+        </p:spPr>
+        <p:style>
+          <a:lnRef idx="1">
+            <a:schemeClr val="accent1"/>
+          </a:lnRef>
+          <a:fillRef idx="0">
+            <a:schemeClr val="accent1"/>
+          </a:fillRef>
+          <a:effectRef idx="0">
+            <a:schemeClr val="accent1"/>
+          </a:effectRef>
+          <a:fontRef idx="minor">
+            <a:schemeClr val="tx1"/>
+          </a:fontRef>
+        </p:style>
+      </p:cxnSp>
+      <p:cxnSp>
+        <p:nvCxnSpPr>
+          <p:cNvPr id="46" name="Straight Arrow Connector 45"/>
+          <p:cNvCxnSpPr/>
+          <p:nvPr/>
+        </p:nvCxnSpPr>
+        <p:spPr>
+          <a:xfrm>
+            <a:off x="6424694" y="3670390"/>
+            <a:ext cx="242748" cy="3344"/>
+          </a:xfrm>
+          <a:prstGeom prst="straightConnector1">
+            <a:avLst/>
+          </a:prstGeom>
+          <a:ln>
+            <a:solidFill>
+              <a:schemeClr val="tx1"/>
+            </a:solidFill>
+            <a:tailEnd type="triangle"/>
+          </a:ln>
+        </p:spPr>
+        <p:style>
+          <a:lnRef idx="1">
+            <a:schemeClr val="accent1"/>
+          </a:lnRef>
+          <a:fillRef idx="0">
+            <a:schemeClr val="accent1"/>
+          </a:fillRef>
+          <a:effectRef idx="0">
+            <a:schemeClr val="accent1"/>
+          </a:effectRef>
+          <a:fontRef idx="minor">
+            <a:schemeClr val="tx1"/>
+          </a:fontRef>
+        </p:style>
+      </p:cxnSp>
+      <p:sp>
+        <p:nvSpPr>
+          <p:cNvPr id="47" name="TextBox 46"/>
+          <p:cNvSpPr txBox="1"/>
+          <p:nvPr/>
+        </p:nvSpPr>
+        <p:spPr>
+          <a:xfrm>
+            <a:off x="5850892" y="3457567"/>
+            <a:ext cx="623889" cy="369332"/>
+          </a:xfrm>
+          <a:prstGeom prst="rect">
+            <a:avLst/>
+          </a:prstGeom>
+          <a:noFill/>
+        </p:spPr>
+        <p:txBody>
+          <a:bodyPr wrap="none" rtlCol="0">
+            <a:spAutoFit/>
+          </a:bodyPr>
+          <a:lstStyle/>
+          <a:p>
+            <a:r>
+              <a:rPr lang="en-US" i="1" dirty="0" smtClean="0">
+                <a:latin typeface="Times New Roman" panose="02020603050405020304" pitchFamily="18" charset="0"/>
+                <a:cs typeface="Times New Roman" panose="02020603050405020304" pitchFamily="18" charset="0"/>
+                <a:sym typeface="Symbol" panose="05050102010706020507" pitchFamily="18" charset="2"/>
+              </a:rPr>
+              <a:t></a:t>
+            </a:r>
+            <a:r>
+              <a:rPr lang="en-US" i="1" dirty="0" smtClean="0">
+                <a:latin typeface="Times New Roman" panose="02020603050405020304" pitchFamily="18" charset="0"/>
+                <a:cs typeface="Times New Roman" panose="02020603050405020304" pitchFamily="18" charset="0"/>
+                <a:sym typeface="Symbol" panose="05050102010706020507" pitchFamily="18" charset="2"/>
+              </a:rPr>
+              <a:t>(</a:t>
+            </a:r>
+            <a:r>
+              <a:rPr lang="en-US" i="1" dirty="0" err="1" smtClean="0">
+                <a:latin typeface="Times New Roman" panose="02020603050405020304" pitchFamily="18" charset="0"/>
+                <a:cs typeface="Times New Roman" panose="02020603050405020304" pitchFamily="18" charset="0"/>
+              </a:rPr>
+              <a:t>x</a:t>
+            </a:r>
+            <a:r>
+              <a:rPr lang="en-US" i="1" baseline="-25000" dirty="0" err="1" smtClean="0">
+                <a:latin typeface="Times New Roman" panose="02020603050405020304" pitchFamily="18" charset="0"/>
+                <a:cs typeface="Times New Roman" panose="02020603050405020304" pitchFamily="18" charset="0"/>
+              </a:rPr>
+              <a:t>j</a:t>
+            </a:r>
+            <a:r>
+              <a:rPr lang="en-US" i="1" dirty="0" smtClean="0">
+                <a:latin typeface="Times New Roman" panose="02020603050405020304" pitchFamily="18" charset="0"/>
+                <a:cs typeface="Times New Roman" panose="02020603050405020304" pitchFamily="18" charset="0"/>
+              </a:rPr>
+              <a:t>)</a:t>
+            </a:r>
+            <a:endParaRPr lang="en-US" i="1" dirty="0">
+              <a:latin typeface="Times New Roman" panose="02020603050405020304" pitchFamily="18" charset="0"/>
+              <a:cs typeface="Times New Roman" panose="02020603050405020304" pitchFamily="18" charset="0"/>
+            </a:endParaRPr>
+          </a:p>
+        </p:txBody>
+      </p:sp>
+      <p:cxnSp>
+        <p:nvCxnSpPr>
+          <p:cNvPr id="48" name="Straight Arrow Connector 47"/>
+          <p:cNvCxnSpPr/>
+          <p:nvPr/>
+        </p:nvCxnSpPr>
+        <p:spPr>
+          <a:xfrm>
+            <a:off x="5693174" y="3652974"/>
+            <a:ext cx="242748" cy="3344"/>
+          </a:xfrm>
+          <a:prstGeom prst="straightConnector1">
+            <a:avLst/>
+          </a:prstGeom>
+          <a:ln>
+            <a:solidFill>
+              <a:schemeClr val="tx1"/>
+            </a:solidFill>
+            <a:tailEnd type="triangle"/>
+          </a:ln>
+        </p:spPr>
+        <p:style>
+          <a:lnRef idx="1">
+            <a:schemeClr val="accent1"/>
+          </a:lnRef>
+          <a:fillRef idx="0">
+            <a:schemeClr val="accent1"/>
+          </a:fillRef>
+          <a:effectRef idx="0">
+            <a:schemeClr val="accent1"/>
+          </a:effectRef>
+          <a:fontRef idx="minor">
+            <a:schemeClr val="tx1"/>
+          </a:fontRef>
+        </p:style>
+      </p:cxnSp>
+      <mc:AlternateContent xmlns:mc="http://schemas.openxmlformats.org/markup-compatibility/2006">
+        <mc:Choice xmlns:a14="http://schemas.microsoft.com/office/drawing/2010/main" Requires="a14">
+          <p:sp>
+            <p:nvSpPr>
+              <p:cNvPr id="49" name="TextBox 48"/>
+              <p:cNvSpPr txBox="1"/>
+              <p:nvPr/>
+            </p:nvSpPr>
+            <p:spPr>
+              <a:xfrm>
+                <a:off x="3037815" y="3229256"/>
+                <a:ext cx="1935338" cy="778418"/>
+              </a:xfrm>
+              <a:prstGeom prst="rect">
+                <a:avLst/>
+              </a:prstGeom>
+              <a:noFill/>
+            </p:spPr>
+            <p:txBody>
+              <a:bodyPr wrap="none" lIns="0" tIns="0" rIns="0" bIns="0" rtlCol="0">
+                <a:spAutoFit/>
+              </a:bodyPr>
+              <a:lstStyle/>
+              <a:p>
+                <a:pPr/>
+                <a14:m>
+                  <m:oMathPara xmlns:m="http://schemas.openxmlformats.org/officeDocument/2006/math">
+                    <m:oMathParaPr>
+                      <m:jc m:val="centerGroup"/>
+                    </m:oMathParaPr>
+                    <m:oMath xmlns:m="http://schemas.openxmlformats.org/officeDocument/2006/math">
+                      <m:r>
+                        <a:rPr lang="en-US" b="0" i="1" smtClean="0">
+                          <a:latin typeface="Cambria Math" panose="02040503050406030204" pitchFamily="18" charset="0"/>
+                        </a:rPr>
+                        <m:t>𝑥</m:t>
+                      </m:r>
+                      <m:r>
+                        <a:rPr lang="en-US" b="0" i="1" baseline="-25000" smtClean="0">
+                          <a:latin typeface="Cambria Math" panose="02040503050406030204" pitchFamily="18" charset="0"/>
+                        </a:rPr>
+                        <m:t>𝑗</m:t>
+                      </m:r>
+                      <m:r>
+                        <a:rPr lang="en-US" b="0" i="1" smtClean="0">
+                          <a:latin typeface="Cambria Math" panose="02040503050406030204" pitchFamily="18" charset="0"/>
+                        </a:rPr>
+                        <m:t>=</m:t>
+                      </m:r>
+                      <m:r>
+                        <a:rPr lang="en-US" b="0" i="1" smtClean="0">
+                          <a:latin typeface="Cambria Math" panose="02040503050406030204" pitchFamily="18" charset="0"/>
+                          <a:sym typeface="Symbol" panose="05050102010706020507" pitchFamily="18" charset="2"/>
+                        </a:rPr>
+                        <m:t></m:t>
+                      </m:r>
+                      <m:r>
+                        <a:rPr lang="en-US" b="0" i="1" baseline="-25000" smtClean="0">
+                          <a:latin typeface="Cambria Math" panose="02040503050406030204" pitchFamily="18" charset="0"/>
+                        </a:rPr>
+                        <m:t>𝑗</m:t>
+                      </m:r>
+                      <m:r>
+                        <a:rPr lang="en-US" b="0" i="1" smtClean="0">
+                          <a:latin typeface="Cambria Math" panose="02040503050406030204" pitchFamily="18" charset="0"/>
+                        </a:rPr>
+                        <m:t>+ </m:t>
+                      </m:r>
+                      <m:nary>
+                        <m:naryPr>
+                          <m:chr m:val="∑"/>
+                          <m:ctrlPr>
+                            <a:rPr lang="pt-BR" i="1" smtClean="0">
+                              <a:latin typeface="Cambria Math" panose="02040503050406030204" pitchFamily="18" charset="0"/>
+                            </a:rPr>
+                          </m:ctrlPr>
+                        </m:naryPr>
+                        <m:sub>
+                          <m:r>
+                            <a:rPr lang="en-US" b="0" i="1" smtClean="0">
+                              <a:latin typeface="Cambria Math" panose="02040503050406030204" pitchFamily="18" charset="0"/>
+                            </a:rPr>
+                            <m:t>𝑖</m:t>
+                          </m:r>
+                          <m:r>
+                            <a:rPr lang="pt-BR" i="1" smtClean="0">
+                              <a:latin typeface="Cambria Math" panose="02040503050406030204" pitchFamily="18" charset="0"/>
+                            </a:rPr>
+                            <m:t>=0</m:t>
+                          </m:r>
+                        </m:sub>
+                        <m:sup>
+                          <m:r>
+                            <a:rPr lang="en-US" b="0" i="1" smtClean="0">
+                              <a:latin typeface="Cambria Math" panose="02040503050406030204" pitchFamily="18" charset="0"/>
+                            </a:rPr>
+                            <m:t>𝑟</m:t>
+                          </m:r>
+                          <m:r>
+                            <a:rPr lang="en-US" b="0" i="1" smtClean="0">
+                              <a:latin typeface="Cambria Math" panose="02040503050406030204" pitchFamily="18" charset="0"/>
+                            </a:rPr>
+                            <m:t>−1</m:t>
+                          </m:r>
+                        </m:sup>
+                        <m:e>
+                          <m:r>
+                            <a:rPr lang="en-US" b="0" i="1" smtClean="0">
+                              <a:latin typeface="Cambria Math" panose="02040503050406030204" pitchFamily="18" charset="0"/>
+                            </a:rPr>
+                            <m:t>𝑢</m:t>
+                          </m:r>
+                          <m:r>
+                            <a:rPr lang="en-US" b="0" i="1" baseline="-25000" smtClean="0">
+                              <a:latin typeface="Cambria Math" panose="02040503050406030204" pitchFamily="18" charset="0"/>
+                            </a:rPr>
+                            <m:t>𝑖</m:t>
+                          </m:r>
+                          <m:r>
+                            <a:rPr lang="en-US" b="0" i="1" smtClean="0">
+                              <a:latin typeface="Cambria Math" panose="02040503050406030204" pitchFamily="18" charset="0"/>
+                              <a:sym typeface="Symbol" panose="05050102010706020507" pitchFamily="18" charset="2"/>
+                            </a:rPr>
+                            <m:t></m:t>
+                          </m:r>
+                          <m:r>
+                            <a:rPr lang="en-US" b="0" i="1" baseline="-25000" smtClean="0">
+                              <a:latin typeface="Cambria Math" panose="02040503050406030204" pitchFamily="18" charset="0"/>
+                            </a:rPr>
+                            <m:t>𝑖</m:t>
+                          </m:r>
+                          <m:r>
+                            <a:rPr lang="en-US" b="0" i="1" baseline="-25000" smtClean="0">
+                              <a:latin typeface="Cambria Math" panose="02040503050406030204" pitchFamily="18" charset="0"/>
+                            </a:rPr>
+                            <m:t>,</m:t>
+                          </m:r>
+                          <m:r>
+                            <a:rPr lang="en-US" b="0" i="1" baseline="-25000" smtClean="0">
+                              <a:latin typeface="Cambria Math" panose="02040503050406030204" pitchFamily="18" charset="0"/>
+                            </a:rPr>
+                            <m:t>𝑗</m:t>
+                          </m:r>
+                        </m:e>
+                      </m:nary>
+                    </m:oMath>
+                  </m:oMathPara>
+                </a14:m>
+                <a:endParaRPr lang="en-US" i="1" dirty="0">
+                  <a:latin typeface="Times New Roman" panose="02020603050405020304" pitchFamily="18" charset="0"/>
+                  <a:cs typeface="Times New Roman" panose="02020603050405020304" pitchFamily="18" charset="0"/>
+                </a:endParaRPr>
+              </a:p>
+            </p:txBody>
+          </p:sp>
+        </mc:Choice>
+        <mc:Fallback>
+          <p:sp>
+            <p:nvSpPr>
+              <p:cNvPr id="49" name="TextBox 48"/>
+              <p:cNvSpPr txBox="1">
+                <a:spLocks noRot="1" noChangeAspect="1" noMove="1" noResize="1" noEditPoints="1" noAdjustHandles="1" noChangeArrowheads="1" noChangeShapeType="1" noTextEdit="1"/>
+              </p:cNvSpPr>
+              <p:nvPr/>
+            </p:nvSpPr>
+            <p:spPr>
+              <a:xfrm>
+                <a:off x="3037815" y="3229256"/>
+                <a:ext cx="1935338" cy="778418"/>
+              </a:xfrm>
+              <a:prstGeom prst="rect">
+                <a:avLst/>
+              </a:prstGeom>
+              <a:blipFill rotWithShape="0">
+                <a:blip r:embed="rId3"/>
+                <a:stretch>
+                  <a:fillRect/>
+                </a:stretch>
+              </a:blipFill>
+            </p:spPr>
+            <p:txBody>
+              <a:bodyPr/>
+              <a:lstStyle/>
+              <a:p>
+                <a:r>
+                  <a:rPr lang="en-US">
+                    <a:noFill/>
+                  </a:rPr>
+                  <a:t> </a:t>
+                </a:r>
+              </a:p>
+            </p:txBody>
+          </p:sp>
+        </mc:Fallback>
+      </mc:AlternateContent>
+      <p:cxnSp>
+        <p:nvCxnSpPr>
+          <p:cNvPr id="50" name="Straight Arrow Connector 49"/>
+          <p:cNvCxnSpPr>
+            <a:endCxn id="49" idx="1"/>
+          </p:cNvCxnSpPr>
+          <p:nvPr/>
+        </p:nvCxnSpPr>
+        <p:spPr>
+          <a:xfrm>
+            <a:off x="1793786" y="2225040"/>
+            <a:ext cx="1244029" cy="1393425"/>
+          </a:xfrm>
+          <a:prstGeom prst="straightConnector1">
+            <a:avLst/>
+          </a:prstGeom>
+          <a:ln>
+            <a:solidFill>
+              <a:schemeClr val="tx1"/>
+            </a:solidFill>
+            <a:tailEnd type="triangle"/>
+          </a:ln>
+        </p:spPr>
+        <p:style>
+          <a:lnRef idx="1">
+            <a:schemeClr val="accent1"/>
+          </a:lnRef>
+          <a:fillRef idx="0">
+            <a:schemeClr val="accent1"/>
+          </a:fillRef>
+          <a:effectRef idx="0">
+            <a:schemeClr val="accent1"/>
+          </a:effectRef>
+          <a:fontRef idx="minor">
+            <a:schemeClr val="tx1"/>
+          </a:fontRef>
+        </p:style>
+      </p:cxnSp>
+      <p:sp>
+        <p:nvSpPr>
+          <p:cNvPr id="51" name="TextBox 50"/>
+          <p:cNvSpPr txBox="1"/>
+          <p:nvPr/>
+        </p:nvSpPr>
+        <p:spPr>
+          <a:xfrm>
+            <a:off x="2336425" y="2502345"/>
+            <a:ext cx="468398" cy="369332"/>
+          </a:xfrm>
+          <a:prstGeom prst="rect">
+            <a:avLst/>
+          </a:prstGeom>
+          <a:noFill/>
+        </p:spPr>
+        <p:txBody>
+          <a:bodyPr wrap="none" rtlCol="0">
+            <a:spAutoFit/>
+          </a:bodyPr>
+          <a:lstStyle/>
+          <a:p>
+            <a:r>
+              <a:rPr lang="en-US" i="1" dirty="0" smtClean="0">
+                <a:latin typeface="Times New Roman" panose="02020603050405020304" pitchFamily="18" charset="0"/>
+                <a:ea typeface="Cambria Math" panose="02040503050406030204" pitchFamily="18" charset="0"/>
+                <a:cs typeface="Times New Roman" panose="02020603050405020304" pitchFamily="18" charset="0"/>
+                <a:sym typeface="Symbol" panose="05050102010706020507" pitchFamily="18" charset="2"/>
+              </a:rPr>
+              <a:t></a:t>
+            </a:r>
+            <a:r>
+              <a:rPr lang="en-US" i="1" baseline="-25000" dirty="0" err="1" smtClean="0">
+                <a:latin typeface="Times New Roman" panose="02020603050405020304" pitchFamily="18" charset="0"/>
+                <a:ea typeface="Cambria Math" panose="02040503050406030204" pitchFamily="18" charset="0"/>
+                <a:cs typeface="Times New Roman" panose="02020603050405020304" pitchFamily="18" charset="0"/>
+                <a:sym typeface="Symbol" panose="05050102010706020507" pitchFamily="18" charset="2"/>
+              </a:rPr>
+              <a:t>i,j</a:t>
+            </a:r>
+            <a:endParaRPr lang="en-US" i="1" baseline="-25000" dirty="0">
+              <a:latin typeface="Times New Roman" panose="02020603050405020304" pitchFamily="18" charset="0"/>
+              <a:ea typeface="Cambria Math" panose="02040503050406030204" pitchFamily="18" charset="0"/>
+              <a:cs typeface="Times New Roman" panose="02020603050405020304" pitchFamily="18" charset="0"/>
+            </a:endParaRPr>
+          </a:p>
+        </p:txBody>
+      </p:sp>
+      <p:sp>
+        <p:nvSpPr>
+          <p:cNvPr id="52" name="Oval 51"/>
+          <p:cNvSpPr/>
+          <p:nvPr/>
+        </p:nvSpPr>
+        <p:spPr>
+          <a:xfrm>
+            <a:off x="672910" y="1161740"/>
+            <a:ext cx="363025" cy="371959"/>
+          </a:xfrm>
+          <a:prstGeom prst="ellipse">
+            <a:avLst/>
+          </a:prstGeom>
+          <a:noFill/>
+          <a:ln w="57150">
+            <a:solidFill>
+              <a:schemeClr val="tx1"/>
+            </a:solidFill>
+          </a:ln>
+        </p:spPr>
+        <p:style>
+          <a:lnRef idx="2">
+            <a:schemeClr val="accent1">
+              <a:shade val="50000"/>
+            </a:schemeClr>
+          </a:lnRef>
+          <a:fillRef idx="1">
+            <a:schemeClr val="accent1"/>
+          </a:fillRef>
+          <a:effectRef idx="0">
+            <a:schemeClr val="accent1"/>
+          </a:effectRef>
+          <a:fontRef idx="minor">
+            <a:schemeClr val="lt1"/>
+          </a:fontRef>
+        </p:style>
+        <p:txBody>
+          <a:bodyPr rtlCol="0" anchor="ctr"/>
+          <a:lstStyle/>
+          <a:p>
+            <a:pPr algn="ctr"/>
+            <a:endParaRPr lang="en-US"/>
+          </a:p>
+        </p:txBody>
+      </p:sp>
+      <p:sp>
+        <p:nvSpPr>
+          <p:cNvPr id="53" name="Oval 52"/>
+          <p:cNvSpPr/>
+          <p:nvPr/>
+        </p:nvSpPr>
+        <p:spPr>
+          <a:xfrm>
+            <a:off x="685457" y="1970362"/>
+            <a:ext cx="363025" cy="371959"/>
+          </a:xfrm>
+          <a:prstGeom prst="ellipse">
+            <a:avLst/>
+          </a:prstGeom>
+          <a:noFill/>
+          <a:ln w="57150">
+            <a:solidFill>
+              <a:schemeClr val="tx1"/>
+            </a:solidFill>
+          </a:ln>
+        </p:spPr>
+        <p:style>
+          <a:lnRef idx="2">
+            <a:schemeClr val="accent1">
+              <a:shade val="50000"/>
+            </a:schemeClr>
+          </a:lnRef>
+          <a:fillRef idx="1">
+            <a:schemeClr val="accent1"/>
+          </a:fillRef>
+          <a:effectRef idx="0">
+            <a:schemeClr val="accent1"/>
+          </a:effectRef>
+          <a:fontRef idx="minor">
+            <a:schemeClr val="lt1"/>
+          </a:fontRef>
+        </p:style>
+        <p:txBody>
+          <a:bodyPr rtlCol="0" anchor="ctr"/>
+          <a:lstStyle/>
+          <a:p>
+            <a:pPr algn="ctr"/>
+            <a:endParaRPr lang="en-US"/>
+          </a:p>
+        </p:txBody>
+      </p:sp>
+      <p:sp>
+        <p:nvSpPr>
+          <p:cNvPr id="54" name="Oval 53"/>
+          <p:cNvSpPr/>
+          <p:nvPr/>
+        </p:nvSpPr>
+        <p:spPr>
+          <a:xfrm>
+            <a:off x="685460" y="2830969"/>
+            <a:ext cx="363025" cy="371959"/>
+          </a:xfrm>
+          <a:prstGeom prst="ellipse">
+            <a:avLst/>
+          </a:prstGeom>
+          <a:noFill/>
+          <a:ln w="57150">
+            <a:solidFill>
+              <a:schemeClr val="tx1"/>
+            </a:solidFill>
+          </a:ln>
+        </p:spPr>
+        <p:style>
+          <a:lnRef idx="2">
+            <a:schemeClr val="accent1">
+              <a:shade val="50000"/>
+            </a:schemeClr>
+          </a:lnRef>
+          <a:fillRef idx="1">
+            <a:schemeClr val="accent1"/>
+          </a:fillRef>
+          <a:effectRef idx="0">
+            <a:schemeClr val="accent1"/>
+          </a:effectRef>
+          <a:fontRef idx="minor">
+            <a:schemeClr val="lt1"/>
+          </a:fontRef>
+        </p:style>
+        <p:txBody>
+          <a:bodyPr rtlCol="0" anchor="ctr"/>
+          <a:lstStyle/>
+          <a:p>
+            <a:pPr algn="ctr"/>
+            <a:endParaRPr lang="en-US"/>
+          </a:p>
+        </p:txBody>
+      </p:sp>
+      <p:sp>
+        <p:nvSpPr>
+          <p:cNvPr id="55" name="TextBox 54"/>
+          <p:cNvSpPr txBox="1"/>
+          <p:nvPr/>
+        </p:nvSpPr>
+        <p:spPr>
+          <a:xfrm>
+            <a:off x="603845" y="3398819"/>
+            <a:ext cx="2398955" cy="707886"/>
+          </a:xfrm>
+          <a:prstGeom prst="rect">
+            <a:avLst/>
+          </a:prstGeom>
+          <a:noFill/>
+        </p:spPr>
+        <p:txBody>
+          <a:bodyPr wrap="square" rtlCol="0">
+            <a:spAutoFit/>
+          </a:bodyPr>
+          <a:lstStyle/>
+          <a:p>
+            <a:r>
+              <a:rPr lang="en-US" sz="2000" i="1" dirty="0" smtClean="0">
+                <a:latin typeface="Times New Roman" panose="02020603050405020304" pitchFamily="18" charset="0"/>
+                <a:cs typeface="Times New Roman" panose="02020603050405020304" pitchFamily="18" charset="0"/>
+              </a:rPr>
+              <a:t>r</a:t>
+            </a:r>
+            <a:r>
+              <a:rPr lang="en-US" sz="2000" dirty="0" smtClean="0"/>
+              <a:t> Input Layer</a:t>
+            </a:r>
+          </a:p>
+          <a:p>
+            <a:r>
+              <a:rPr lang="en-US" sz="2000" dirty="0" smtClean="0">
+                <a:latin typeface="Times New Roman" panose="02020603050405020304" pitchFamily="18" charset="0"/>
+                <a:cs typeface="Times New Roman" panose="02020603050405020304" pitchFamily="18" charset="0"/>
+              </a:rPr>
+              <a:t>0</a:t>
+            </a:r>
+            <a:r>
+              <a:rPr lang="en-US" sz="2000" dirty="0" smtClean="0"/>
+              <a:t> </a:t>
+            </a:r>
+            <a:r>
+              <a:rPr lang="en-US" sz="2000" dirty="0" smtClean="0">
+                <a:sym typeface="Symbol" panose="05050102010706020507" pitchFamily="18" charset="2"/>
+              </a:rPr>
+              <a:t> </a:t>
+            </a:r>
+            <a:r>
+              <a:rPr lang="en-US" sz="2000" i="1" dirty="0" err="1" smtClean="0">
+                <a:latin typeface="Times New Roman" panose="02020603050405020304" pitchFamily="18" charset="0"/>
+                <a:cs typeface="Times New Roman" panose="02020603050405020304" pitchFamily="18" charset="0"/>
+                <a:sym typeface="Symbol" panose="05050102010706020507" pitchFamily="18" charset="2"/>
+              </a:rPr>
+              <a:t>i</a:t>
+            </a:r>
+            <a:r>
+              <a:rPr lang="en-US" sz="2000" dirty="0">
+                <a:sym typeface="Symbol" panose="05050102010706020507" pitchFamily="18" charset="2"/>
+              </a:rPr>
+              <a:t> </a:t>
+            </a:r>
+            <a:r>
+              <a:rPr lang="en-US" sz="2000" dirty="0" smtClean="0">
+                <a:sym typeface="Symbol" panose="05050102010706020507" pitchFamily="18" charset="2"/>
+              </a:rPr>
+              <a:t> </a:t>
+            </a:r>
+            <a:r>
+              <a:rPr lang="en-US" sz="2000" i="1" dirty="0" smtClean="0">
+                <a:latin typeface="Times New Roman" panose="02020603050405020304" pitchFamily="18" charset="0"/>
+                <a:cs typeface="Times New Roman" panose="02020603050405020304" pitchFamily="18" charset="0"/>
+                <a:sym typeface="Symbol" panose="05050102010706020507" pitchFamily="18" charset="2"/>
+              </a:rPr>
+              <a:t>r</a:t>
+            </a:r>
+            <a:endParaRPr lang="en-US" sz="2000" i="1" dirty="0">
+              <a:latin typeface="Times New Roman" panose="02020603050405020304" pitchFamily="18" charset="0"/>
+              <a:cs typeface="Times New Roman" panose="02020603050405020304" pitchFamily="18" charset="0"/>
+            </a:endParaRPr>
+          </a:p>
+        </p:txBody>
+      </p:sp>
+      <p:cxnSp>
+        <p:nvCxnSpPr>
+          <p:cNvPr id="56" name="Straight Arrow Connector 55"/>
+          <p:cNvCxnSpPr/>
+          <p:nvPr/>
+        </p:nvCxnSpPr>
+        <p:spPr>
+          <a:xfrm>
+            <a:off x="1105853" y="2158134"/>
+            <a:ext cx="424942" cy="3554"/>
+          </a:xfrm>
+          <a:prstGeom prst="straightConnector1">
+            <a:avLst/>
+          </a:prstGeom>
+          <a:ln>
+            <a:solidFill>
+              <a:schemeClr val="tx1"/>
+            </a:solidFill>
+            <a:tailEnd type="triangle"/>
+          </a:ln>
+        </p:spPr>
+        <p:style>
+          <a:lnRef idx="1">
+            <a:schemeClr val="accent1"/>
+          </a:lnRef>
+          <a:fillRef idx="0">
+            <a:schemeClr val="accent1"/>
+          </a:fillRef>
+          <a:effectRef idx="0">
+            <a:schemeClr val="accent1"/>
+          </a:effectRef>
+          <a:fontRef idx="minor">
+            <a:schemeClr val="tx1"/>
+          </a:fontRef>
+        </p:style>
+      </p:cxnSp>
+      <p:sp>
+        <p:nvSpPr>
+          <p:cNvPr id="57" name="TextBox 56"/>
+          <p:cNvSpPr txBox="1"/>
+          <p:nvPr/>
+        </p:nvSpPr>
+        <p:spPr>
+          <a:xfrm>
+            <a:off x="1554105" y="1959085"/>
+            <a:ext cx="343364" cy="369332"/>
+          </a:xfrm>
+          <a:prstGeom prst="rect">
+            <a:avLst/>
+          </a:prstGeom>
+          <a:noFill/>
+        </p:spPr>
+        <p:txBody>
+          <a:bodyPr wrap="none" rtlCol="0">
+            <a:spAutoFit/>
+          </a:bodyPr>
+          <a:lstStyle/>
+          <a:p>
+            <a:r>
+              <a:rPr lang="en-US" i="1" dirty="0" err="1" smtClean="0">
+                <a:latin typeface="Times New Roman" panose="02020603050405020304" pitchFamily="18" charset="0"/>
+                <a:ea typeface="Cambria Math" panose="02040503050406030204" pitchFamily="18" charset="0"/>
+                <a:cs typeface="Times New Roman" panose="02020603050405020304" pitchFamily="18" charset="0"/>
+                <a:sym typeface="Symbol" panose="05050102010706020507" pitchFamily="18" charset="2"/>
+              </a:rPr>
+              <a:t>u</a:t>
+            </a:r>
+            <a:r>
+              <a:rPr lang="en-US" i="1" baseline="-25000" dirty="0" err="1" smtClean="0">
+                <a:latin typeface="Times New Roman" panose="02020603050405020304" pitchFamily="18" charset="0"/>
+                <a:ea typeface="Cambria Math" panose="02040503050406030204" pitchFamily="18" charset="0"/>
+                <a:cs typeface="Times New Roman" panose="02020603050405020304" pitchFamily="18" charset="0"/>
+                <a:sym typeface="Symbol" panose="05050102010706020507" pitchFamily="18" charset="2"/>
+              </a:rPr>
+              <a:t>i</a:t>
+            </a:r>
+            <a:endParaRPr lang="en-US" i="1" baseline="-25000" dirty="0">
+              <a:latin typeface="Times New Roman" panose="02020603050405020304" pitchFamily="18" charset="0"/>
+              <a:ea typeface="Cambria Math" panose="02040503050406030204" pitchFamily="18" charset="0"/>
+              <a:cs typeface="Times New Roman" panose="02020603050405020304" pitchFamily="18" charset="0"/>
+            </a:endParaRPr>
+          </a:p>
+        </p:txBody>
+      </p:sp>
+      <p:cxnSp>
+        <p:nvCxnSpPr>
+          <p:cNvPr id="58" name="Straight Arrow Connector 57"/>
+          <p:cNvCxnSpPr/>
+          <p:nvPr/>
+        </p:nvCxnSpPr>
+        <p:spPr>
+          <a:xfrm>
+            <a:off x="4941809" y="3667149"/>
+            <a:ext cx="242748" cy="3344"/>
+          </a:xfrm>
+          <a:prstGeom prst="straightConnector1">
+            <a:avLst/>
+          </a:prstGeom>
+          <a:ln>
+            <a:solidFill>
+              <a:schemeClr val="tx1"/>
+            </a:solidFill>
+            <a:tailEnd type="triangle"/>
+          </a:ln>
+        </p:spPr>
+        <p:style>
+          <a:lnRef idx="1">
+            <a:schemeClr val="accent1"/>
+          </a:lnRef>
+          <a:fillRef idx="0">
+            <a:schemeClr val="accent1"/>
+          </a:fillRef>
+          <a:effectRef idx="0">
+            <a:schemeClr val="accent1"/>
+          </a:effectRef>
+          <a:fontRef idx="minor">
+            <a:schemeClr val="tx1"/>
+          </a:fontRef>
+        </p:style>
+      </p:cxnSp>
+    </p:spTree>
+    <p:extLst>
+      <p:ext uri="{BB962C8B-B14F-4D97-AF65-F5344CB8AC3E}">
+        <p14:creationId xmlns:p14="http://schemas.microsoft.com/office/powerpoint/2010/main" val="2383635970"/>
       </p:ext>
     </p:extLst>
   </p:cSld>

</xml_diff>

<commit_message>
correction of the equations
</commit_message>
<xml_diff>
--- a/source/supervised/gradient/figures/figures.pptx
+++ b/source/supervised/gradient/figures/figures.pptx
@@ -8437,7 +8437,7 @@
         <p:spPr>
           <a:xfrm>
             <a:off x="11539890" y="2596187"/>
-            <a:ext cx="512961" cy="369332"/>
+            <a:ext cx="583493" cy="369332"/>
           </a:xfrm>
           <a:prstGeom prst="rect">
             <a:avLst/>
@@ -8454,7 +8454,17 @@
               <a:rPr lang="en-US" dirty="0" err="1" smtClean="0"/>
               <a:t>aco</a:t>
             </a:r>
-            <a:endParaRPr lang="en-US" dirty="0"/>
+            <a:r>
+              <a:rPr lang="en-US" i="1" baseline="-25000" dirty="0" err="1" smtClean="0">
+                <a:latin typeface="Times New Roman" panose="02020603050405020304" pitchFamily="18" charset="0"/>
+                <a:cs typeface="Times New Roman" panose="02020603050405020304" pitchFamily="18" charset="0"/>
+              </a:rPr>
+              <a:t>k</a:t>
+            </a:r>
+            <a:endParaRPr lang="en-US" i="1" baseline="-25000" dirty="0">
+              <a:latin typeface="Times New Roman" panose="02020603050405020304" pitchFamily="18" charset="0"/>
+              <a:cs typeface="Times New Roman" panose="02020603050405020304" pitchFamily="18" charset="0"/>
+            </a:endParaRPr>
           </a:p>
         </p:txBody>
       </p:sp>

</xml_diff>